<commit_message>
added mention of Differentiable Architecture Search (technically not ICML)
</commit_message>
<xml_diff>
--- a/ICML 2018 Presentation.pptx
+++ b/ICML 2018 Presentation.pptx
@@ -26,10 +26,10 @@
     <p:sldId id="272" r:id="rId17"/>
     <p:sldId id="292" r:id="rId18"/>
     <p:sldId id="291" r:id="rId19"/>
-    <p:sldId id="273" r:id="rId20"/>
-    <p:sldId id="286" r:id="rId21"/>
-    <p:sldId id="287" r:id="rId22"/>
-    <p:sldId id="294" r:id="rId23"/>
+    <p:sldId id="286" r:id="rId20"/>
+    <p:sldId id="287" r:id="rId21"/>
+    <p:sldId id="294" r:id="rId22"/>
+    <p:sldId id="273" r:id="rId23"/>
     <p:sldId id="295" r:id="rId24"/>
     <p:sldId id="288" r:id="rId25"/>
     <p:sldId id="289" r:id="rId26"/>
@@ -226,7 +226,7 @@
           <a:p>
             <a:fld id="{66675625-DB33-48C3-AE77-36F6E69CEA46}" type="datetimeFigureOut">
               <a:rPr lang="en-US" smtClean="0"/>
-              <a:t>7/30/18</a:t>
+              <a:t>7/31/18</a:t>
             </a:fld>
             <a:endParaRPr lang="en-US"/>
           </a:p>
@@ -1326,7 +1326,7 @@
     </p:spTree>
     <p:extLst>
       <p:ext uri="{BB962C8B-B14F-4D97-AF65-F5344CB8AC3E}">
-        <p14:creationId xmlns:p14="http://schemas.microsoft.com/office/powerpoint/2010/main" val="3603435042"/>
+        <p14:creationId xmlns:p14="http://schemas.microsoft.com/office/powerpoint/2010/main" val="3548201713"/>
       </p:ext>
     </p:extLst>
   </p:cSld>
@@ -1410,7 +1410,7 @@
     </p:spTree>
     <p:extLst>
       <p:ext uri="{BB962C8B-B14F-4D97-AF65-F5344CB8AC3E}">
-        <p14:creationId xmlns:p14="http://schemas.microsoft.com/office/powerpoint/2010/main" val="3548201713"/>
+        <p14:creationId xmlns:p14="http://schemas.microsoft.com/office/powerpoint/2010/main" val="1736521868"/>
       </p:ext>
     </p:extLst>
   </p:cSld>
@@ -1578,7 +1578,7 @@
     </p:spTree>
     <p:extLst>
       <p:ext uri="{BB962C8B-B14F-4D97-AF65-F5344CB8AC3E}">
-        <p14:creationId xmlns:p14="http://schemas.microsoft.com/office/powerpoint/2010/main" val="1736521868"/>
+        <p14:creationId xmlns:p14="http://schemas.microsoft.com/office/powerpoint/2010/main" val="2038869664"/>
       </p:ext>
     </p:extLst>
   </p:cSld>
@@ -1662,7 +1662,7 @@
     </p:spTree>
     <p:extLst>
       <p:ext uri="{BB962C8B-B14F-4D97-AF65-F5344CB8AC3E}">
-        <p14:creationId xmlns:p14="http://schemas.microsoft.com/office/powerpoint/2010/main" val="2038869664"/>
+        <p14:creationId xmlns:p14="http://schemas.microsoft.com/office/powerpoint/2010/main" val="3603435042"/>
       </p:ext>
     </p:extLst>
   </p:cSld>
@@ -7354,7 +7354,7 @@
           <a:p>
             <a:fld id="{D9E0ADFA-BDA2-462F-965A-CBA33F837B76}" type="datetimeFigureOut">
               <a:rPr lang="en-US" smtClean="0"/>
-              <a:t>7/30/18</a:t>
+              <a:t>7/31/18</a:t>
             </a:fld>
             <a:endParaRPr lang="en-US"/>
           </a:p>
@@ -13162,84 +13162,59 @@
         </p:nvSpPr>
         <p:spPr/>
         <p:txBody>
-          <a:bodyPr>
-            <a:normAutofit lnSpcReduction="10000"/>
-          </a:bodyPr>
+          <a:bodyPr/>
           <a:lstStyle/>
           <a:p>
             <a:r>
               <a:rPr lang="en-US" dirty="0"/>
-              <a:t>Advances in neural architecture search</a:t>
+              <a:t>Unlabeled data is cheap, labels are expensive and not always useful</a:t>
+            </a:r>
+          </a:p>
+          <a:p>
+            <a:r>
+              <a:rPr lang="en-US" dirty="0"/>
+              <a:t>Active learning: machine chooses which labels to request</a:t>
             </a:r>
           </a:p>
           <a:p>
             <a:pPr lvl="1"/>
             <a:r>
               <a:rPr lang="en-US" dirty="0"/>
-              <a:t>Classic NAS (2017) uses RL to train a controller RNN to build networks</a:t>
+              <a:t>Hand-engineered criteria yield inconsistent results</a:t>
+            </a:r>
+          </a:p>
+          <a:p>
+            <a:pPr lvl="1"/>
+            <a:r>
+              <a:rPr lang="en-US" dirty="0"/>
+              <a:t>Idea: let’s learn active learning!</a:t>
+            </a:r>
+          </a:p>
+          <a:p>
+            <a:pPr lvl="1"/>
+            <a:r>
+              <a:rPr lang="en-US" dirty="0"/>
+              <a:t>RL phrasing:</a:t>
             </a:r>
           </a:p>
           <a:p>
             <a:pPr lvl="2"/>
             <a:r>
               <a:rPr lang="en-US" dirty="0"/>
-              <a:t>Extremely slow because every candidate network is trained from scratch</a:t>
-            </a:r>
-          </a:p>
-          <a:p>
-            <a:pPr lvl="1"/>
-            <a:r>
-              <a:rPr lang="en-US" dirty="0"/>
-              <a:t>SMASH trains a hypernetwork to generate low-rank weights</a:t>
-            </a:r>
-          </a:p>
-          <a:p>
-            <a:pPr lvl="1"/>
-            <a:r>
-              <a:rPr lang="en-US" dirty="0"/>
-              <a:t>ENAS keeps a shared set of weights, 1000x less expensive than NAS</a:t>
+              <a:t>Policy actions are data point queries</a:t>
             </a:r>
           </a:p>
           <a:p>
             <a:pPr lvl="2"/>
             <a:r>
               <a:rPr lang="en-US" dirty="0"/>
-              <a:t>Training alternates between controller and sampled child network</a:t>
-            </a:r>
-          </a:p>
-          <a:p>
-            <a:pPr lvl="1"/>
-            <a:r>
-              <a:rPr lang="en-US" dirty="0"/>
-              <a:t>“One-shot” method trains one giant network with path dropout</a:t>
-            </a:r>
-          </a:p>
-          <a:p>
-            <a:pPr lvl="2"/>
-            <a:r>
-              <a:rPr lang="en-US" dirty="0"/>
-              <a:t>Candidate networks are obtained by selectively zeroing out operations</a:t>
-            </a:r>
-          </a:p>
-          <a:p>
-            <a:pPr lvl="2"/>
-            <a:r>
-              <a:rPr lang="en-US" dirty="0"/>
-              <a:t>No need for RL or hypernetworks</a:t>
-            </a:r>
-          </a:p>
-          <a:p>
-            <a:pPr lvl="1"/>
-            <a:r>
-              <a:rPr lang="en-US" dirty="0"/>
-              <a:t>Evolutionary algorithms may yield better networks than RL approaches</a:t>
-            </a:r>
-          </a:p>
-          <a:p>
-            <a:pPr lvl="2"/>
-            <a:r>
-              <a:rPr lang="en-US" dirty="0"/>
-              <a:t>But require a great deal more compute to successfully train</a:t>
+              <a:t>Reward is increment of classifier accuracy</a:t>
+            </a:r>
+          </a:p>
+          <a:p>
+            <a:r>
+              <a:rPr lang="en-US" dirty="0"/>
+              <a:t>Challenging to train when horizon (# data to label) is long</a:t>
             </a:r>
           </a:p>
         </p:txBody>
@@ -13271,7 +13246,7 @@
             </a:r>
             <a:r>
               <a:rPr lang="en-US" dirty="0"/>
-              <a:t> (1 of 5) – Architecture Search</a:t>
+              <a:t> (1 of 5) – Active Learning</a:t>
             </a:r>
           </a:p>
         </p:txBody>
@@ -13279,7 +13254,7 @@
     </p:spTree>
     <p:extLst>
       <p:ext uri="{BB962C8B-B14F-4D97-AF65-F5344CB8AC3E}">
-        <p14:creationId xmlns:p14="http://schemas.microsoft.com/office/powerpoint/2010/main" val="734910288"/>
+        <p14:creationId xmlns:p14="http://schemas.microsoft.com/office/powerpoint/2010/main" val="2242671388"/>
       </p:ext>
     </p:extLst>
   </p:cSld>
@@ -13351,6 +13326,13 @@
             <a:pPr lvl="1"/>
             <a:r>
               <a:rPr lang="en-US" dirty="0"/>
+              <a:t>Architecture search (now possible with 1 GPU!)</a:t>
+            </a:r>
+          </a:p>
+          <a:p>
+            <a:pPr lvl="1"/>
+            <a:r>
+              <a:rPr lang="en-US" dirty="0"/>
               <a:t>Security and fairness (ICML best paper awards)</a:t>
             </a:r>
           </a:p>
@@ -13364,7 +13346,7 @@
           <a:p>
             <a:r>
               <a:rPr lang="en-US" dirty="0"/>
-              <a:t>This will be a shallow overview</a:t>
+              <a:t>This will be a whirlwind overview</a:t>
             </a:r>
           </a:p>
           <a:p>
@@ -13379,29 +13361,6 @@
             <a:r>
               <a:rPr lang="en-US" dirty="0"/>
               <a:t>I’ll send the papers and/or prepare a deeper presentation on those</a:t>
-            </a:r>
-          </a:p>
-          <a:p>
-            <a:pPr lvl="1"/>
-            <a:r>
-              <a:rPr lang="en-US" dirty="0"/>
-              <a:t>My full notes: https://</a:t>
-            </a:r>
-            <a:r>
-              <a:rPr lang="en-US" dirty="0" err="1"/>
-              <a:t>github.com</a:t>
-            </a:r>
-            <a:r>
-              <a:rPr lang="en-US" dirty="0"/>
-              <a:t>/</a:t>
-            </a:r>
-            <a:r>
-              <a:rPr lang="en-US" dirty="0" err="1"/>
-              <a:t>EbTech</a:t>
-            </a:r>
-            <a:r>
-              <a:rPr lang="en-US" dirty="0"/>
-              <a:t>/ICML-2018</a:t>
             </a:r>
           </a:p>
         </p:txBody>
@@ -13487,54 +13446,93 @@
           <a:p>
             <a:r>
               <a:rPr lang="en-US" dirty="0"/>
-              <a:t>Unlabeled data is cheap, labels are expensive and not always useful</a:t>
-            </a:r>
-          </a:p>
-          <a:p>
-            <a:r>
-              <a:rPr lang="en-US" dirty="0"/>
-              <a:t>Active learning: machine chooses which labels to request</a:t>
+              <a:t>Meta-learning can be viewed as few-shot supervised regression</a:t>
             </a:r>
           </a:p>
           <a:p>
             <a:pPr lvl="1"/>
             <a:r>
               <a:rPr lang="en-US" dirty="0"/>
-              <a:t>Hand-engineered criteria yield inconsistent results</a:t>
+              <a:t>Learn the learner f: </a:t>
+            </a:r>
+            <a:r>
+              <a:rPr lang="en-US" dirty="0" err="1"/>
+              <a:t>x</a:t>
+            </a:r>
+            <a:r>
+              <a:rPr lang="en-US" baseline="-25000" dirty="0" err="1"/>
+              <a:t>train</a:t>
+            </a:r>
+            <a:r>
+              <a:rPr lang="en-US" dirty="0"/>
+              <a:t>, </a:t>
+            </a:r>
+            <a:r>
+              <a:rPr lang="en-US" dirty="0" err="1"/>
+              <a:t>y</a:t>
+            </a:r>
+            <a:r>
+              <a:rPr lang="en-US" baseline="-25000" dirty="0" err="1"/>
+              <a:t>train</a:t>
+            </a:r>
+            <a:r>
+              <a:rPr lang="en-US" dirty="0"/>
+              <a:t>, </a:t>
+            </a:r>
+            <a:r>
+              <a:rPr lang="en-US" dirty="0" err="1"/>
+              <a:t>x</a:t>
+            </a:r>
+            <a:r>
+              <a:rPr lang="en-US" baseline="-25000" dirty="0" err="1"/>
+              <a:t>test</a:t>
+            </a:r>
+            <a:r>
+              <a:rPr lang="en-US" dirty="0"/>
+              <a:t> -&gt; </a:t>
+            </a:r>
+            <a:r>
+              <a:rPr lang="en-US" dirty="0" err="1"/>
+              <a:t>y</a:t>
+            </a:r>
+            <a:r>
+              <a:rPr lang="en-US" baseline="-25000" dirty="0" err="1"/>
+              <a:t>test</a:t>
+            </a:r>
+            <a:endParaRPr lang="en-US" dirty="0"/>
+          </a:p>
+          <a:p>
+            <a:r>
+              <a:rPr lang="en-US" dirty="0"/>
+              <a:t>Desirable properties to aim for:</a:t>
             </a:r>
           </a:p>
           <a:p>
             <a:pPr lvl="1"/>
             <a:r>
               <a:rPr lang="en-US" dirty="0"/>
-              <a:t>Idea: let’s learn active learning!</a:t>
+              <a:t>Expressive power: universal learning procedure approximator</a:t>
             </a:r>
           </a:p>
           <a:p>
             <a:pPr lvl="1"/>
             <a:r>
               <a:rPr lang="en-US" dirty="0"/>
-              <a:t>RL phrasing:</a:t>
-            </a:r>
-          </a:p>
-          <a:p>
-            <a:pPr lvl="2"/>
-            <a:r>
-              <a:rPr lang="en-US" dirty="0"/>
-              <a:t>Policy actions are data point queries</a:t>
-            </a:r>
-          </a:p>
-          <a:p>
-            <a:pPr lvl="2"/>
-            <a:r>
-              <a:rPr lang="en-US" dirty="0"/>
-              <a:t>Reward is increment of classifier accuracy</a:t>
-            </a:r>
-          </a:p>
-          <a:p>
-            <a:r>
-              <a:rPr lang="en-US" dirty="0"/>
-              <a:t>Challenging to train when horizon (# data to label) is long</a:t>
+              <a:t>Consistency: can solve even out-of-distribution tasks, given enough data</a:t>
+            </a:r>
+          </a:p>
+          <a:p>
+            <a:pPr lvl="1"/>
+            <a:r>
+              <a:rPr lang="en-US" dirty="0"/>
+              <a:t>First-order: no need to differentiate through learning</a:t>
+            </a:r>
+          </a:p>
+          <a:p>
+            <a:pPr lvl="1"/>
+            <a:r>
+              <a:rPr lang="en-US" dirty="0"/>
+              <a:t>Uncertainty awareness: can deal with ambiguity</a:t>
             </a:r>
           </a:p>
         </p:txBody>
@@ -13566,7 +13564,7 @@
             </a:r>
             <a:r>
               <a:rPr lang="en-US" dirty="0"/>
-              <a:t> (2 of 5) – Active Learning</a:t>
+              <a:t> (2 of 5) – Meta-Learning</a:t>
             </a:r>
           </a:p>
         </p:txBody>
@@ -13574,7 +13572,7 @@
     </p:spTree>
     <p:extLst>
       <p:ext uri="{BB962C8B-B14F-4D97-AF65-F5344CB8AC3E}">
-        <p14:creationId xmlns:p14="http://schemas.microsoft.com/office/powerpoint/2010/main" val="2242671388"/>
+        <p14:creationId xmlns:p14="http://schemas.microsoft.com/office/powerpoint/2010/main" val="648476842"/>
       </p:ext>
     </p:extLst>
   </p:cSld>
@@ -13624,14 +13622,22 @@
           <a:p>
             <a:r>
               <a:rPr lang="en-US" dirty="0"/>
-              <a:t>Meta-learning can be viewed as few-shot supervised regression</a:t>
+              <a:t>Blackbox approaches</a:t>
             </a:r>
           </a:p>
           <a:p>
             <a:pPr lvl="1"/>
             <a:r>
-              <a:rPr lang="en-US" dirty="0"/>
-              <a:t>Learn the learner f: </a:t>
+              <a:rPr lang="en-US" dirty="0" err="1"/>
+              <a:t>y</a:t>
+            </a:r>
+            <a:r>
+              <a:rPr lang="en-US" baseline="-25000" dirty="0" err="1"/>
+              <a:t>test</a:t>
+            </a:r>
+            <a:r>
+              <a:rPr lang="en-US" dirty="0"/>
+              <a:t> = f(</a:t>
             </a:r>
             <a:r>
               <a:rPr lang="en-US" dirty="0" err="1"/>
@@ -13667,8 +13673,11 @@
             </a:r>
             <a:r>
               <a:rPr lang="en-US" dirty="0"/>
-              <a:t> -&gt; </a:t>
-            </a:r>
+              <a:t>; 𝜃) or</a:t>
+            </a:r>
+          </a:p>
+          <a:p>
+            <a:pPr lvl="1"/>
             <a:r>
               <a:rPr lang="en-US" dirty="0" err="1"/>
               <a:t>y</a:t>
@@ -13677,40 +13686,79 @@
               <a:rPr lang="en-US" baseline="-25000" dirty="0" err="1"/>
               <a:t>test</a:t>
             </a:r>
-            <a:endParaRPr lang="en-US" dirty="0"/>
-          </a:p>
-          <a:p>
-            <a:r>
-              <a:rPr lang="en-US" dirty="0"/>
-              <a:t>Desirable properties to aim for:</a:t>
+            <a:r>
+              <a:rPr lang="en-US" dirty="0"/>
+              <a:t> = f(</a:t>
+            </a:r>
+            <a:r>
+              <a:rPr lang="en-US" dirty="0" err="1"/>
+              <a:t>x</a:t>
+            </a:r>
+            <a:r>
+              <a:rPr lang="en-US" baseline="-25000" dirty="0" err="1"/>
+              <a:t>test</a:t>
+            </a:r>
+            <a:r>
+              <a:rPr lang="en-US" dirty="0"/>
+              <a:t>; g(</a:t>
+            </a:r>
+            <a:r>
+              <a:rPr lang="en-US" dirty="0" err="1"/>
+              <a:t>x</a:t>
+            </a:r>
+            <a:r>
+              <a:rPr lang="en-US" baseline="-25000" dirty="0" err="1"/>
+              <a:t>train</a:t>
+            </a:r>
+            <a:r>
+              <a:rPr lang="en-US" dirty="0"/>
+              <a:t>, </a:t>
+            </a:r>
+            <a:r>
+              <a:rPr lang="en-US" dirty="0" err="1"/>
+              <a:t>y</a:t>
+            </a:r>
+            <a:r>
+              <a:rPr lang="en-US" baseline="-25000" dirty="0" err="1"/>
+              <a:t>train</a:t>
+            </a:r>
+            <a:r>
+              <a:rPr lang="en-US" dirty="0"/>
+              <a:t>; 𝜃))</a:t>
             </a:r>
           </a:p>
           <a:p>
             <a:pPr lvl="1"/>
             <a:r>
               <a:rPr lang="en-US" dirty="0"/>
-              <a:t>Expressive power: universal learning procedure approximator</a:t>
+              <a:t>Has expressive power but not consistency</a:t>
             </a:r>
           </a:p>
           <a:p>
             <a:pPr lvl="1"/>
             <a:r>
               <a:rPr lang="en-US" dirty="0"/>
-              <a:t>Consistency: can solve even out-of-distribution tasks, given enough data</a:t>
+              <a:t>Hard to optimize due to generality, lack of inductive bias</a:t>
+            </a:r>
+          </a:p>
+          <a:p>
+            <a:r>
+              <a:rPr lang="en-US" dirty="0"/>
+              <a:t>More structured approaches were referenced</a:t>
             </a:r>
           </a:p>
           <a:p>
             <a:pPr lvl="1"/>
             <a:r>
               <a:rPr lang="en-US" dirty="0"/>
-              <a:t>First-order: no need to differentiate through learning</a:t>
+              <a:t>Based on nearest neighbors in a learned metric space, or gradient descent from a learned initialization</a:t>
             </a:r>
           </a:p>
           <a:p>
             <a:pPr lvl="1"/>
             <a:r>
               <a:rPr lang="en-US" dirty="0"/>
-              <a:t>Uncertainty awareness: can deal with ambiguity</a:t>
+              <a:t>Model ambiguity by sampling classifiers?</a:t>
             </a:r>
           </a:p>
         </p:txBody>
@@ -13750,7 +13798,7 @@
     </p:spTree>
     <p:extLst>
       <p:ext uri="{BB962C8B-B14F-4D97-AF65-F5344CB8AC3E}">
-        <p14:creationId xmlns:p14="http://schemas.microsoft.com/office/powerpoint/2010/main" val="648476842"/>
+        <p14:creationId xmlns:p14="http://schemas.microsoft.com/office/powerpoint/2010/main" val="2906423121"/>
       </p:ext>
     </p:extLst>
   </p:cSld>
@@ -13795,148 +13843,63 @@
         </p:nvSpPr>
         <p:spPr/>
         <p:txBody>
-          <a:bodyPr/>
+          <a:bodyPr>
+            <a:normAutofit/>
+          </a:bodyPr>
           <a:lstStyle/>
           <a:p>
             <a:r>
               <a:rPr lang="en-US" dirty="0"/>
-              <a:t>Blackbox approaches</a:t>
+              <a:t>Advances in neural architecture search</a:t>
             </a:r>
           </a:p>
           <a:p>
             <a:pPr lvl="1"/>
             <a:r>
-              <a:rPr lang="en-US" dirty="0" err="1"/>
-              <a:t>y</a:t>
-            </a:r>
-            <a:r>
-              <a:rPr lang="en-US" baseline="-25000" dirty="0" err="1"/>
-              <a:t>test</a:t>
-            </a:r>
-            <a:r>
-              <a:rPr lang="en-US" dirty="0"/>
-              <a:t> = f(</a:t>
-            </a:r>
-            <a:r>
-              <a:rPr lang="en-US" dirty="0" err="1"/>
-              <a:t>x</a:t>
-            </a:r>
-            <a:r>
-              <a:rPr lang="en-US" baseline="-25000" dirty="0" err="1"/>
-              <a:t>train</a:t>
-            </a:r>
-            <a:r>
-              <a:rPr lang="en-US" dirty="0"/>
-              <a:t>, </a:t>
-            </a:r>
-            <a:r>
-              <a:rPr lang="en-US" dirty="0" err="1"/>
-              <a:t>y</a:t>
-            </a:r>
-            <a:r>
-              <a:rPr lang="en-US" baseline="-25000" dirty="0" err="1"/>
-              <a:t>train</a:t>
-            </a:r>
-            <a:r>
-              <a:rPr lang="en-US" dirty="0"/>
-              <a:t>, </a:t>
-            </a:r>
-            <a:r>
-              <a:rPr lang="en-US" dirty="0" err="1"/>
-              <a:t>x</a:t>
-            </a:r>
-            <a:r>
-              <a:rPr lang="en-US" baseline="-25000" dirty="0" err="1"/>
-              <a:t>test</a:t>
-            </a:r>
-            <a:r>
-              <a:rPr lang="en-US" dirty="0"/>
-              <a:t>; 𝜃) or</a:t>
+              <a:rPr lang="en-US" dirty="0"/>
+              <a:t>Classic NAS (2017) uses controller RNN to build candidate networks</a:t>
+            </a:r>
+          </a:p>
+          <a:p>
+            <a:pPr lvl="2"/>
+            <a:r>
+              <a:rPr lang="en-US" dirty="0"/>
+              <a:t>Controller is trained by RL on the final validation loss</a:t>
+            </a:r>
+          </a:p>
+          <a:p>
+            <a:pPr lvl="2"/>
+            <a:r>
+              <a:rPr lang="en-US" dirty="0"/>
+              <a:t>Extremely slow because every candidate network is trained from scratch</a:t>
             </a:r>
           </a:p>
           <a:p>
             <a:pPr lvl="1"/>
             <a:r>
-              <a:rPr lang="en-US" dirty="0" err="1"/>
-              <a:t>y</a:t>
-            </a:r>
-            <a:r>
-              <a:rPr lang="en-US" baseline="-25000" dirty="0" err="1"/>
-              <a:t>test</a:t>
-            </a:r>
-            <a:r>
-              <a:rPr lang="en-US" dirty="0"/>
-              <a:t> = f(</a:t>
-            </a:r>
-            <a:r>
-              <a:rPr lang="en-US" dirty="0" err="1"/>
-              <a:t>x</a:t>
-            </a:r>
-            <a:r>
-              <a:rPr lang="en-US" baseline="-25000" dirty="0" err="1"/>
-              <a:t>test</a:t>
-            </a:r>
-            <a:r>
-              <a:rPr lang="en-US" dirty="0"/>
-              <a:t>; g(</a:t>
-            </a:r>
-            <a:r>
-              <a:rPr lang="en-US" dirty="0" err="1"/>
-              <a:t>x</a:t>
-            </a:r>
-            <a:r>
-              <a:rPr lang="en-US" baseline="-25000" dirty="0" err="1"/>
-              <a:t>train</a:t>
-            </a:r>
-            <a:r>
-              <a:rPr lang="en-US" dirty="0"/>
-              <a:t>, </a:t>
-            </a:r>
-            <a:r>
-              <a:rPr lang="en-US" dirty="0" err="1"/>
-              <a:t>y</a:t>
-            </a:r>
-            <a:r>
-              <a:rPr lang="en-US" baseline="-25000" dirty="0" err="1"/>
-              <a:t>train</a:t>
-            </a:r>
-            <a:r>
-              <a:rPr lang="en-US" dirty="0"/>
-              <a:t>; 𝜃))</a:t>
+              <a:rPr lang="en-US" dirty="0"/>
+              <a:t>SMASH trains a hypernetwork to generate low-rank weights</a:t>
             </a:r>
           </a:p>
           <a:p>
             <a:pPr lvl="1"/>
             <a:r>
               <a:rPr lang="en-US" dirty="0"/>
-              <a:t>Has expressive power but not consistency</a:t>
-            </a:r>
-          </a:p>
-          <a:p>
-            <a:pPr lvl="1"/>
-            <a:r>
-              <a:rPr lang="en-US" dirty="0"/>
-              <a:t>Hard to optimize due to generality, lack of inductive bias</a:t>
-            </a:r>
-          </a:p>
-          <a:p>
-            <a:r>
-              <a:rPr lang="en-US" dirty="0"/>
-              <a:t>More structured approaches were referenced</a:t>
-            </a:r>
-          </a:p>
-          <a:p>
-            <a:pPr lvl="1"/>
-            <a:r>
-              <a:rPr lang="en-US" dirty="0"/>
-              <a:t>Based on nearest neighbors in a learned metric space, or gradient descent from a learned initialization</a:t>
-            </a:r>
-          </a:p>
-          <a:p>
-            <a:pPr lvl="1"/>
-            <a:r>
-              <a:rPr lang="en-US" dirty="0"/>
-              <a:t>Model ambiguity by sampling classifiers?</a:t>
+              <a:t>ENAS shares the weights between candidate networks</a:t>
+            </a:r>
+          </a:p>
+          <a:p>
+            <a:pPr lvl="2"/>
+            <a:r>
+              <a:rPr lang="en-US" dirty="0"/>
+              <a:t>Training alternates between controller and sampled child network</a:t>
+            </a:r>
+          </a:p>
+          <a:p>
+            <a:pPr lvl="2"/>
+            <a:r>
+              <a:rPr lang="en-US" dirty="0"/>
+              <a:t>1000x less expensive than NAS, feasible on 1 GPU</a:t>
             </a:r>
           </a:p>
         </p:txBody>
@@ -13968,7 +13931,7 @@
             </a:r>
             <a:r>
               <a:rPr lang="en-US" dirty="0"/>
-              <a:t> (4 of 5) – Meta-Learning</a:t>
+              <a:t> (4 of 5) – Architecture Search</a:t>
             </a:r>
           </a:p>
         </p:txBody>
@@ -13976,7 +13939,7 @@
     </p:spTree>
     <p:extLst>
       <p:ext uri="{BB962C8B-B14F-4D97-AF65-F5344CB8AC3E}">
-        <p14:creationId xmlns:p14="http://schemas.microsoft.com/office/powerpoint/2010/main" val="2906423121"/>
+        <p14:creationId xmlns:p14="http://schemas.microsoft.com/office/powerpoint/2010/main" val="734910288"/>
       </p:ext>
     </p:extLst>
   </p:cSld>
@@ -14021,11 +13984,54 @@
         </p:nvSpPr>
         <p:spPr/>
         <p:txBody>
-          <a:bodyPr/>
+          <a:bodyPr>
+            <a:normAutofit/>
+          </a:bodyPr>
           <a:lstStyle/>
           <a:p>
             <a:r>
               <a:rPr lang="en-US" dirty="0"/>
+              <a:t>Simpler methods without a controller or hypernetwork</a:t>
+            </a:r>
+          </a:p>
+          <a:p>
+            <a:pPr lvl="1"/>
+            <a:r>
+              <a:rPr lang="en-US" dirty="0"/>
+              <a:t>“One-shot” method trains one giant network with path dropout</a:t>
+            </a:r>
+          </a:p>
+          <a:p>
+            <a:pPr lvl="2"/>
+            <a:r>
+              <a:rPr lang="en-US" dirty="0"/>
+              <a:t>Candidate networks are obtained by selectively zeroing out operations</a:t>
+            </a:r>
+          </a:p>
+          <a:p>
+            <a:pPr lvl="1"/>
+            <a:r>
+              <a:rPr lang="en-US" dirty="0"/>
+              <a:t>DARTS: differentiable architecture search</a:t>
+            </a:r>
+          </a:p>
+          <a:p>
+            <a:pPr lvl="1"/>
+            <a:r>
+              <a:rPr lang="en-US" dirty="0"/>
+              <a:t>Evolutionary algorithms may yield better networks than RL approaches</a:t>
+            </a:r>
+          </a:p>
+          <a:p>
+            <a:pPr lvl="2"/>
+            <a:r>
+              <a:rPr lang="en-US" dirty="0"/>
+              <a:t>But require a great deal more compute to successfully train</a:t>
+            </a:r>
+          </a:p>
+          <a:p>
+            <a:r>
+              <a:rPr lang="en-US" dirty="0"/>
               <a:t>Controversial suggestion:</a:t>
             </a:r>
           </a:p>
@@ -14041,20 +14047,6 @@
             <a:r>
               <a:rPr lang="en-US" dirty="0"/>
               <a:t>If adopted by ICML &amp; NIPS, all the major labs would have to release their work in order to retain their research scientists!</a:t>
-            </a:r>
-          </a:p>
-          <a:p>
-            <a:r>
-              <a:rPr lang="en-US" dirty="0"/>
-              <a:t>Next </a:t>
-            </a:r>
-            <a:r>
-              <a:rPr lang="en-US" dirty="0" err="1"/>
-              <a:t>AutoML</a:t>
-            </a:r>
-            <a:r>
-              <a:rPr lang="en-US" dirty="0"/>
-              <a:t> challenge: NIPS 2018</a:t>
             </a:r>
           </a:p>
         </p:txBody>
@@ -14086,7 +14078,7 @@
             </a:r>
             <a:r>
               <a:rPr lang="en-US" dirty="0"/>
-              <a:t> (5 of 5) – Panel</a:t>
+              <a:t> (5 of 5) – Architecture Search</a:t>
             </a:r>
           </a:p>
         </p:txBody>

</xml_diff>

<commit_message>
renamed societal impact slides to 'Fairness'
</commit_message>
<xml_diff>
--- a/ICML 2018 Presentation.pptx
+++ b/ICML 2018 Presentation.pptx
@@ -13342,13 +13342,8 @@
           <a:p>
             <a:r>
               <a:rPr lang="en-US" dirty="0"/>
-              <a:t>This will be a </a:t>
-            </a:r>
-            <a:r>
-              <a:rPr lang="en-US"/>
-              <a:t>whirlwind tour</a:t>
-            </a:r>
-            <a:endParaRPr lang="en-US" dirty="0"/>
+              <a:t>This will be a whirlwind tour</a:t>
+            </a:r>
           </a:p>
           <a:p>
             <a:pPr lvl="1"/>
@@ -14719,7 +14714,9 @@
         </p:nvSpPr>
         <p:spPr/>
         <p:txBody>
-          <a:bodyPr/>
+          <a:bodyPr>
+            <a:normAutofit/>
+          </a:bodyPr>
           <a:lstStyle/>
           <a:p>
             <a:r>
@@ -14773,6 +14770,13 @@
             <a:r>
               <a:rPr lang="en-US" dirty="0"/>
               <a:t>Challenging to make these ideas precise…</a:t>
+            </a:r>
+          </a:p>
+          <a:p>
+            <a:pPr lvl="2"/>
+            <a:r>
+              <a:rPr lang="en-US" dirty="0"/>
+              <a:t>Need to consider incentives, causality, and long-term impact</a:t>
             </a:r>
           </a:p>
         </p:txBody>
@@ -14800,7 +14804,7 @@
           <a:p>
             <a:r>
               <a:rPr lang="en-US" dirty="0"/>
-              <a:t>Societal Impact (1 of 2) – Overview</a:t>
+              <a:t>Fairness (1 of 2) – Overview</a:t>
             </a:r>
           </a:p>
         </p:txBody>
@@ -14853,7 +14857,9 @@
         </p:nvSpPr>
         <p:spPr/>
         <p:txBody>
-          <a:bodyPr/>
+          <a:bodyPr>
+            <a:normAutofit lnSpcReduction="10000"/>
+          </a:bodyPr>
           <a:lstStyle/>
           <a:p>
             <a:r>
@@ -14920,6 +14926,10 @@
           <a:p>
             <a:pPr lvl="1"/>
             <a:r>
+              <a:rPr lang="en-US" dirty="0"/>
+              <a:t>Demographic parity: </a:t>
+            </a:r>
+            <a:r>
               <a:rPr lang="en-US" dirty="0" err="1"/>
               <a:t>Yhat⟂S</a:t>
             </a:r>
@@ -14928,6 +14938,10 @@
           <a:p>
             <a:pPr lvl="1"/>
             <a:r>
+              <a:rPr lang="en-US" dirty="0"/>
+              <a:t>Equalized odds: </a:t>
+            </a:r>
+            <a:r>
               <a:rPr lang="en-US" dirty="0" err="1"/>
               <a:t>Yhat⟂S</a:t>
             </a:r>
@@ -14940,13 +14954,36 @@
             <a:pPr lvl="1"/>
             <a:r>
               <a:rPr lang="en-US" dirty="0"/>
-              <a:t>Y⟂S | </a:t>
+              <a:t>Calibration: Y⟂S | </a:t>
             </a:r>
             <a:r>
               <a:rPr lang="en-US" dirty="0" err="1"/>
               <a:t>Yhat</a:t>
             </a:r>
             <a:endParaRPr lang="en-US" dirty="0"/>
+          </a:p>
+          <a:p>
+            <a:pPr lvl="2"/>
+            <a:r>
+              <a:rPr lang="en-US" dirty="0"/>
+              <a:t>Used by Northpointe </a:t>
+            </a:r>
+            <a:r>
+              <a:rPr lang="en-US"/>
+              <a:t>to defend its </a:t>
+            </a:r>
+            <a:r>
+              <a:rPr lang="en-US" dirty="0"/>
+              <a:t>criminal profiling </a:t>
+            </a:r>
+            <a:r>
+              <a:rPr lang="en-US" dirty="0" err="1"/>
+              <a:t>wrt</a:t>
+            </a:r>
+            <a:r>
+              <a:rPr lang="en-US" dirty="0"/>
+              <a:t> race</a:t>
+            </a:r>
           </a:p>
           <a:p>
             <a:pPr lvl="1"/>
@@ -15007,7 +15044,7 @@
           <a:p>
             <a:r>
               <a:rPr lang="en-US" dirty="0"/>
-              <a:t>Societal Impact (2 of 2) – Formal Criteria</a:t>
+              <a:t>Fairness (2 of 2) – Formal Criteria</a:t>
             </a:r>
           </a:p>
         </p:txBody>

</xml_diff>